<commit_message>
modify the pptx file for MCP
</commit_message>
<xml_diff>
--- a/raspberry-pi-report/MCPについて.pptx
+++ b/raspberry-pi-report/MCPについて.pptx
@@ -133,7 +133,7 @@
 <file path=ppt/revisionInfo.xml><?xml version="1.0" encoding="utf-8"?>
 <p1510:revInfo xmlns:a="http://schemas.openxmlformats.org/drawingml/2006/main" xmlns:r="http://schemas.openxmlformats.org/officeDocument/2006/relationships" xmlns:p1510="http://schemas.microsoft.com/office/powerpoint/2015/10/main">
   <p1510:revLst>
-    <p1510:client id="{70332866-803F-45E9-A120-6101FBB807E0}" v="161" dt="2025-09-22T15:44:54.967"/>
+    <p1510:client id="{70332866-803F-45E9-A120-6101FBB807E0}" v="164" dt="2025-09-22T21:56:24.040"/>
   </p1510:revLst>
 </p1510:revInfo>
 </file>
@@ -143,7 +143,7 @@
   <pc:docChgLst>
     <pc:chgData name="Yoshiharu Hamaguchi" userId="470e288704938fe9" providerId="LiveId" clId="{2DA42A88-41D6-4A1A-8697-2120E1337F92}"/>
     <pc:docChg chg="undo redo custSel addSld delSld modSld sldOrd">
-      <pc:chgData name="Yoshiharu Hamaguchi" userId="470e288704938fe9" providerId="LiveId" clId="{2DA42A88-41D6-4A1A-8697-2120E1337F92}" dt="2025-09-22T15:48:47.623" v="8780" actId="1076"/>
+      <pc:chgData name="Yoshiharu Hamaguchi" userId="470e288704938fe9" providerId="LiveId" clId="{2DA42A88-41D6-4A1A-8697-2120E1337F92}" dt="2025-09-22T21:56:36.376" v="8977" actId="14100"/>
       <pc:docMkLst>
         <pc:docMk/>
       </pc:docMkLst>
@@ -404,7 +404,7 @@
         </pc:cxnChg>
       </pc:sldChg>
       <pc:sldChg chg="addSp delSp modSp mod">
-        <pc:chgData name="Yoshiharu Hamaguchi" userId="470e288704938fe9" providerId="LiveId" clId="{2DA42A88-41D6-4A1A-8697-2120E1337F92}" dt="2025-09-22T15:20:14.128" v="7238" actId="1076"/>
+        <pc:chgData name="Yoshiharu Hamaguchi" userId="470e288704938fe9" providerId="LiveId" clId="{2DA42A88-41D6-4A1A-8697-2120E1337F92}" dt="2025-09-22T21:56:36.376" v="8977" actId="14100"/>
         <pc:sldMkLst>
           <pc:docMk/>
           <pc:sldMk cId="11239393" sldId="276"/>
@@ -426,7 +426,7 @@
           </ac:spMkLst>
         </pc:spChg>
         <pc:spChg chg="add mod">
-          <ac:chgData name="Yoshiharu Hamaguchi" userId="470e288704938fe9" providerId="LiveId" clId="{2DA42A88-41D6-4A1A-8697-2120E1337F92}" dt="2025-09-15T16:09:36.666" v="4343" actId="1076"/>
+          <ac:chgData name="Yoshiharu Hamaguchi" userId="470e288704938fe9" providerId="LiveId" clId="{2DA42A88-41D6-4A1A-8697-2120E1337F92}" dt="2025-09-22T21:53:49.618" v="8844" actId="20577"/>
           <ac:spMkLst>
             <pc:docMk/>
             <pc:sldMk cId="11239393" sldId="276"/>
@@ -593,6 +593,22 @@
             <ac:cxnSpMk id="14" creationId="{5218F3D2-7381-D685-D677-9E8118260AEF}"/>
           </ac:cxnSpMkLst>
         </pc:cxnChg>
+        <pc:cxnChg chg="add del">
+          <ac:chgData name="Yoshiharu Hamaguchi" userId="470e288704938fe9" providerId="LiveId" clId="{2DA42A88-41D6-4A1A-8697-2120E1337F92}" dt="2025-09-22T21:56:05.243" v="8970" actId="478"/>
+          <ac:cxnSpMkLst>
+            <pc:docMk/>
+            <pc:sldMk cId="11239393" sldId="276"/>
+            <ac:cxnSpMk id="20" creationId="{4D400084-69CE-E9BB-F169-048F5320F97D}"/>
+          </ac:cxnSpMkLst>
+        </pc:cxnChg>
+        <pc:cxnChg chg="add mod">
+          <ac:chgData name="Yoshiharu Hamaguchi" userId="470e288704938fe9" providerId="LiveId" clId="{2DA42A88-41D6-4A1A-8697-2120E1337F92}" dt="2025-09-22T21:56:20.595" v="8974" actId="14100"/>
+          <ac:cxnSpMkLst>
+            <pc:docMk/>
+            <pc:sldMk cId="11239393" sldId="276"/>
+            <ac:cxnSpMk id="22" creationId="{47782C65-7EC7-F6D2-7D77-81FCA6256230}"/>
+          </ac:cxnSpMkLst>
+        </pc:cxnChg>
         <pc:cxnChg chg="mod">
           <ac:chgData name="Yoshiharu Hamaguchi" userId="470e288704938fe9" providerId="LiveId" clId="{2DA42A88-41D6-4A1A-8697-2120E1337F92}" dt="2025-09-15T16:03:44.577" v="4168" actId="14100"/>
           <ac:cxnSpMkLst>
@@ -601,8 +617,16 @@
             <ac:cxnSpMk id="24" creationId="{4FBB7B7D-AFEC-E59C-E034-11A16E604744}"/>
           </ac:cxnSpMkLst>
         </pc:cxnChg>
+        <pc:cxnChg chg="add mod">
+          <ac:chgData name="Yoshiharu Hamaguchi" userId="470e288704938fe9" providerId="LiveId" clId="{2DA42A88-41D6-4A1A-8697-2120E1337F92}" dt="2025-09-22T21:56:36.376" v="8977" actId="14100"/>
+          <ac:cxnSpMkLst>
+            <pc:docMk/>
+            <pc:sldMk cId="11239393" sldId="276"/>
+            <ac:cxnSpMk id="26" creationId="{35430383-3C78-61B1-D569-530E7D66AA27}"/>
+          </ac:cxnSpMkLst>
+        </pc:cxnChg>
         <pc:cxnChg chg="add mod ord">
-          <ac:chgData name="Yoshiharu Hamaguchi" userId="470e288704938fe9" providerId="LiveId" clId="{2DA42A88-41D6-4A1A-8697-2120E1337F92}" dt="2025-09-15T16:09:46.313" v="4344" actId="14100"/>
+          <ac:chgData name="Yoshiharu Hamaguchi" userId="470e288704938fe9" providerId="LiveId" clId="{2DA42A88-41D6-4A1A-8697-2120E1337F92}" dt="2025-09-22T21:56:28.746" v="8976" actId="14100"/>
           <ac:cxnSpMkLst>
             <pc:docMk/>
             <pc:sldMk cId="11239393" sldId="276"/>
@@ -823,7 +847,7 @@
         </pc:sldMkLst>
       </pc:sldChg>
       <pc:sldChg chg="addSp delSp modSp add mod">
-        <pc:chgData name="Yoshiharu Hamaguchi" userId="470e288704938fe9" providerId="LiveId" clId="{2DA42A88-41D6-4A1A-8697-2120E1337F92}" dt="2025-09-22T13:47:02.570" v="6666" actId="571"/>
+        <pc:chgData name="Yoshiharu Hamaguchi" userId="470e288704938fe9" providerId="LiveId" clId="{2DA42A88-41D6-4A1A-8697-2120E1337F92}" dt="2025-09-22T21:54:51.783" v="8968" actId="20577"/>
         <pc:sldMkLst>
           <pc:docMk/>
           <pc:sldMk cId="1743033552" sldId="280"/>
@@ -866,6 +890,14 @@
             <pc:docMk/>
             <pc:sldMk cId="1743033552" sldId="280"/>
             <ac:spMk id="7" creationId="{0486A1B1-83AE-6CF1-4881-D891249C6749}"/>
+          </ac:spMkLst>
+        </pc:spChg>
+        <pc:spChg chg="add mod">
+          <ac:chgData name="Yoshiharu Hamaguchi" userId="470e288704938fe9" providerId="LiveId" clId="{2DA42A88-41D6-4A1A-8697-2120E1337F92}" dt="2025-09-22T21:53:05.629" v="8836" actId="20577"/>
+          <ac:spMkLst>
+            <pc:docMk/>
+            <pc:sldMk cId="1743033552" sldId="280"/>
+            <ac:spMk id="8" creationId="{F0B18779-1321-ADDA-A880-D69EAF844C55}"/>
           </ac:spMkLst>
         </pc:spChg>
         <pc:spChg chg="add mod ord">
@@ -957,7 +989,7 @@
           </ac:spMkLst>
         </pc:spChg>
         <pc:spChg chg="add mod">
-          <ac:chgData name="Yoshiharu Hamaguchi" userId="470e288704938fe9" providerId="LiveId" clId="{2DA42A88-41D6-4A1A-8697-2120E1337F92}" dt="2025-09-15T15:00:12.290" v="2276" actId="20577"/>
+          <ac:chgData name="Yoshiharu Hamaguchi" userId="470e288704938fe9" providerId="LiveId" clId="{2DA42A88-41D6-4A1A-8697-2120E1337F92}" dt="2025-09-22T21:54:51.783" v="8968" actId="20577"/>
           <ac:spMkLst>
             <pc:docMk/>
             <pc:sldMk cId="1743033552" sldId="280"/>
@@ -2717,7 +2749,7 @@
           <a:p>
             <a:fld id="{9627246E-3903-4E01-B28D-BFF5567D65C3}" type="datetimeFigureOut">
               <a:rPr kumimoji="1" lang="ja-JP" altLang="en-US" smtClean="0"/>
-              <a:t>2025/9/22</a:t>
+              <a:t>2025/9/23</a:t>
             </a:fld>
             <a:endParaRPr kumimoji="1" lang="ja-JP" altLang="en-US"/>
           </a:p>
@@ -2947,7 +2979,7 @@
           <a:p>
             <a:fld id="{9627246E-3903-4E01-B28D-BFF5567D65C3}" type="datetimeFigureOut">
               <a:rPr kumimoji="1" lang="ja-JP" altLang="en-US" smtClean="0"/>
-              <a:t>2025/9/22</a:t>
+              <a:t>2025/9/23</a:t>
             </a:fld>
             <a:endParaRPr kumimoji="1" lang="ja-JP" altLang="en-US"/>
           </a:p>
@@ -3187,7 +3219,7 @@
           <a:p>
             <a:fld id="{9627246E-3903-4E01-B28D-BFF5567D65C3}" type="datetimeFigureOut">
               <a:rPr kumimoji="1" lang="ja-JP" altLang="en-US" smtClean="0"/>
-              <a:t>2025/9/22</a:t>
+              <a:t>2025/9/23</a:t>
             </a:fld>
             <a:endParaRPr kumimoji="1" lang="ja-JP" altLang="en-US"/>
           </a:p>
@@ -3417,7 +3449,7 @@
           <a:p>
             <a:fld id="{9627246E-3903-4E01-B28D-BFF5567D65C3}" type="datetimeFigureOut">
               <a:rPr kumimoji="1" lang="ja-JP" altLang="en-US" smtClean="0"/>
-              <a:t>2025/9/22</a:t>
+              <a:t>2025/9/23</a:t>
             </a:fld>
             <a:endParaRPr kumimoji="1" lang="ja-JP" altLang="en-US"/>
           </a:p>
@@ -3692,7 +3724,7 @@
           <a:p>
             <a:fld id="{9627246E-3903-4E01-B28D-BFF5567D65C3}" type="datetimeFigureOut">
               <a:rPr kumimoji="1" lang="ja-JP" altLang="en-US" smtClean="0"/>
-              <a:t>2025/9/22</a:t>
+              <a:t>2025/9/23</a:t>
             </a:fld>
             <a:endParaRPr kumimoji="1" lang="ja-JP" altLang="en-US"/>
           </a:p>
@@ -4021,7 +4053,7 @@
           <a:p>
             <a:fld id="{9627246E-3903-4E01-B28D-BFF5567D65C3}" type="datetimeFigureOut">
               <a:rPr kumimoji="1" lang="ja-JP" altLang="en-US" smtClean="0"/>
-              <a:t>2025/9/22</a:t>
+              <a:t>2025/9/23</a:t>
             </a:fld>
             <a:endParaRPr kumimoji="1" lang="ja-JP" altLang="en-US"/>
           </a:p>
@@ -4497,7 +4529,7 @@
           <a:p>
             <a:fld id="{9627246E-3903-4E01-B28D-BFF5567D65C3}" type="datetimeFigureOut">
               <a:rPr kumimoji="1" lang="ja-JP" altLang="en-US" smtClean="0"/>
-              <a:t>2025/9/22</a:t>
+              <a:t>2025/9/23</a:t>
             </a:fld>
             <a:endParaRPr kumimoji="1" lang="ja-JP" altLang="en-US"/>
           </a:p>
@@ -4638,7 +4670,7 @@
           <a:p>
             <a:fld id="{9627246E-3903-4E01-B28D-BFF5567D65C3}" type="datetimeFigureOut">
               <a:rPr kumimoji="1" lang="ja-JP" altLang="en-US" smtClean="0"/>
-              <a:t>2025/9/22</a:t>
+              <a:t>2025/9/23</a:t>
             </a:fld>
             <a:endParaRPr kumimoji="1" lang="ja-JP" altLang="en-US"/>
           </a:p>
@@ -4751,7 +4783,7 @@
           <a:p>
             <a:fld id="{9627246E-3903-4E01-B28D-BFF5567D65C3}" type="datetimeFigureOut">
               <a:rPr kumimoji="1" lang="ja-JP" altLang="en-US" smtClean="0"/>
-              <a:t>2025/9/22</a:t>
+              <a:t>2025/9/23</a:t>
             </a:fld>
             <a:endParaRPr kumimoji="1" lang="ja-JP" altLang="en-US"/>
           </a:p>
@@ -5094,7 +5126,7 @@
           <a:p>
             <a:fld id="{9627246E-3903-4E01-B28D-BFF5567D65C3}" type="datetimeFigureOut">
               <a:rPr kumimoji="1" lang="ja-JP" altLang="en-US" smtClean="0"/>
-              <a:t>2025/9/22</a:t>
+              <a:t>2025/9/23</a:t>
             </a:fld>
             <a:endParaRPr kumimoji="1" lang="ja-JP" altLang="en-US"/>
           </a:p>
@@ -5382,7 +5414,7 @@
           <a:p>
             <a:fld id="{9627246E-3903-4E01-B28D-BFF5567D65C3}" type="datetimeFigureOut">
               <a:rPr kumimoji="1" lang="ja-JP" altLang="en-US" smtClean="0"/>
-              <a:t>2025/9/22</a:t>
+              <a:t>2025/9/23</a:t>
             </a:fld>
             <a:endParaRPr kumimoji="1" lang="ja-JP" altLang="en-US"/>
           </a:p>
@@ -5655,7 +5687,7 @@
           <a:p>
             <a:fld id="{9627246E-3903-4E01-B28D-BFF5567D65C3}" type="datetimeFigureOut">
               <a:rPr kumimoji="1" lang="ja-JP" altLang="en-US" smtClean="0"/>
-              <a:t>2025/9/22</a:t>
+              <a:t>2025/9/23</a:t>
             </a:fld>
             <a:endParaRPr kumimoji="1" lang="ja-JP" altLang="en-US"/>
           </a:p>
@@ -17781,19 +17813,15 @@
             </a:r>
             <a:r>
               <a:rPr lang="ja-JP" altLang="en-US" dirty="0"/>
-              <a:t>は、ここの</a:t>
+              <a:t>は、下記領域の責務・</a:t>
             </a:r>
             <a:endParaRPr lang="en-US" altLang="ja-JP" dirty="0"/>
           </a:p>
           <a:p>
             <a:pPr algn="ctr"/>
             <a:r>
-              <a:rPr lang="en-US" altLang="ja-JP" dirty="0"/>
-              <a:t>I/F</a:t>
-            </a:r>
-            <a:r>
               <a:rPr lang="ja-JP" altLang="en-US" dirty="0"/>
-              <a:t>や責務、通信仕様、開発ツールなどを含んでいます。</a:t>
+              <a:t>プロトコル仕様・開発ツールなどを含んでいます。</a:t>
             </a:r>
             <a:endParaRPr kumimoji="1" lang="ja-JP" altLang="en-US" dirty="0"/>
           </a:p>
@@ -18235,6 +18263,217 @@
           </a:fontRef>
         </p:style>
       </p:cxnSp>
+      <p:sp>
+        <p:nvSpPr>
+          <p:cNvPr id="8" name="コンテンツ プレースホルダー 11">
+            <a:extLst>
+              <a:ext uri="{FF2B5EF4-FFF2-40B4-BE49-F238E27FC236}">
+                <a16:creationId xmlns:a16="http://schemas.microsoft.com/office/drawing/2014/main" id="{F0B18779-1321-ADDA-A880-D69EAF844C55}"/>
+              </a:ext>
+            </a:extLst>
+          </p:cNvPr>
+          <p:cNvSpPr txBox="1">
+            <a:spLocks/>
+          </p:cNvSpPr>
+          <p:nvPr/>
+        </p:nvSpPr>
+        <p:spPr>
+          <a:xfrm>
+            <a:off x="6376778" y="5449698"/>
+            <a:ext cx="1660664" cy="271804"/>
+          </a:xfrm>
+          <a:prstGeom prst="rect">
+            <a:avLst/>
+          </a:prstGeom>
+        </p:spPr>
+        <p:txBody>
+          <a:bodyPr vert="horz" lIns="91440" tIns="45720" rIns="91440" bIns="45720" rtlCol="0">
+            <a:normAutofit fontScale="77500" lnSpcReduction="20000"/>
+          </a:bodyPr>
+          <a:lstStyle>
+            <a:lvl1pPr marL="228600" indent="-228600" algn="l" defTabSz="914400" rtl="0" eaLnBrk="1" latinLnBrk="0" hangingPunct="1">
+              <a:lnSpc>
+                <a:spcPct val="90000"/>
+              </a:lnSpc>
+              <a:spcBef>
+                <a:spcPts val="1000"/>
+              </a:spcBef>
+              <a:buFont typeface="Arial" panose="020B0604020202020204" pitchFamily="34" charset="0"/>
+              <a:buChar char="•"/>
+              <a:defRPr kumimoji="1" sz="2800" kern="1200">
+                <a:solidFill>
+                  <a:schemeClr val="tx1"/>
+                </a:solidFill>
+                <a:latin typeface="+mn-lt"/>
+                <a:ea typeface="+mn-ea"/>
+                <a:cs typeface="+mn-cs"/>
+              </a:defRPr>
+            </a:lvl1pPr>
+            <a:lvl2pPr marL="685800" indent="-228600" algn="l" defTabSz="914400" rtl="0" eaLnBrk="1" latinLnBrk="0" hangingPunct="1">
+              <a:lnSpc>
+                <a:spcPct val="90000"/>
+              </a:lnSpc>
+              <a:spcBef>
+                <a:spcPts val="500"/>
+              </a:spcBef>
+              <a:buFont typeface="Arial" panose="020B0604020202020204" pitchFamily="34" charset="0"/>
+              <a:buChar char="•"/>
+              <a:defRPr kumimoji="1" sz="2400" kern="1200">
+                <a:solidFill>
+                  <a:schemeClr val="tx1"/>
+                </a:solidFill>
+                <a:latin typeface="+mn-lt"/>
+                <a:ea typeface="+mn-ea"/>
+                <a:cs typeface="+mn-cs"/>
+              </a:defRPr>
+            </a:lvl2pPr>
+            <a:lvl3pPr marL="1143000" indent="-228600" algn="l" defTabSz="914400" rtl="0" eaLnBrk="1" latinLnBrk="0" hangingPunct="1">
+              <a:lnSpc>
+                <a:spcPct val="90000"/>
+              </a:lnSpc>
+              <a:spcBef>
+                <a:spcPts val="500"/>
+              </a:spcBef>
+              <a:buFont typeface="Arial" panose="020B0604020202020204" pitchFamily="34" charset="0"/>
+              <a:buChar char="•"/>
+              <a:defRPr kumimoji="1" sz="2000" kern="1200">
+                <a:solidFill>
+                  <a:schemeClr val="tx1"/>
+                </a:solidFill>
+                <a:latin typeface="+mn-lt"/>
+                <a:ea typeface="+mn-ea"/>
+                <a:cs typeface="+mn-cs"/>
+              </a:defRPr>
+            </a:lvl3pPr>
+            <a:lvl4pPr marL="1600200" indent="-228600" algn="l" defTabSz="914400" rtl="0" eaLnBrk="1" latinLnBrk="0" hangingPunct="1">
+              <a:lnSpc>
+                <a:spcPct val="90000"/>
+              </a:lnSpc>
+              <a:spcBef>
+                <a:spcPts val="500"/>
+              </a:spcBef>
+              <a:buFont typeface="Arial" panose="020B0604020202020204" pitchFamily="34" charset="0"/>
+              <a:buChar char="•"/>
+              <a:defRPr kumimoji="1" sz="1800" kern="1200">
+                <a:solidFill>
+                  <a:schemeClr val="tx1"/>
+                </a:solidFill>
+                <a:latin typeface="+mn-lt"/>
+                <a:ea typeface="+mn-ea"/>
+                <a:cs typeface="+mn-cs"/>
+              </a:defRPr>
+            </a:lvl4pPr>
+            <a:lvl5pPr marL="2057400" indent="-228600" algn="l" defTabSz="914400" rtl="0" eaLnBrk="1" latinLnBrk="0" hangingPunct="1">
+              <a:lnSpc>
+                <a:spcPct val="90000"/>
+              </a:lnSpc>
+              <a:spcBef>
+                <a:spcPts val="500"/>
+              </a:spcBef>
+              <a:buFont typeface="Arial" panose="020B0604020202020204" pitchFamily="34" charset="0"/>
+              <a:buChar char="•"/>
+              <a:defRPr kumimoji="1" sz="1800" kern="1200">
+                <a:solidFill>
+                  <a:schemeClr val="tx1"/>
+                </a:solidFill>
+                <a:latin typeface="+mn-lt"/>
+                <a:ea typeface="+mn-ea"/>
+                <a:cs typeface="+mn-cs"/>
+              </a:defRPr>
+            </a:lvl5pPr>
+            <a:lvl6pPr marL="2514600" indent="-228600" algn="l" defTabSz="914400" rtl="0" eaLnBrk="1" latinLnBrk="0" hangingPunct="1">
+              <a:lnSpc>
+                <a:spcPct val="90000"/>
+              </a:lnSpc>
+              <a:spcBef>
+                <a:spcPts val="500"/>
+              </a:spcBef>
+              <a:buFont typeface="Arial" panose="020B0604020202020204" pitchFamily="34" charset="0"/>
+              <a:buChar char="•"/>
+              <a:defRPr kumimoji="1" sz="1800" kern="1200">
+                <a:solidFill>
+                  <a:schemeClr val="tx1"/>
+                </a:solidFill>
+                <a:latin typeface="+mn-lt"/>
+                <a:ea typeface="+mn-ea"/>
+                <a:cs typeface="+mn-cs"/>
+              </a:defRPr>
+            </a:lvl6pPr>
+            <a:lvl7pPr marL="2971800" indent="-228600" algn="l" defTabSz="914400" rtl="0" eaLnBrk="1" latinLnBrk="0" hangingPunct="1">
+              <a:lnSpc>
+                <a:spcPct val="90000"/>
+              </a:lnSpc>
+              <a:spcBef>
+                <a:spcPts val="500"/>
+              </a:spcBef>
+              <a:buFont typeface="Arial" panose="020B0604020202020204" pitchFamily="34" charset="0"/>
+              <a:buChar char="•"/>
+              <a:defRPr kumimoji="1" sz="1800" kern="1200">
+                <a:solidFill>
+                  <a:schemeClr val="tx1"/>
+                </a:solidFill>
+                <a:latin typeface="+mn-lt"/>
+                <a:ea typeface="+mn-ea"/>
+                <a:cs typeface="+mn-cs"/>
+              </a:defRPr>
+            </a:lvl7pPr>
+            <a:lvl8pPr marL="3429000" indent="-228600" algn="l" defTabSz="914400" rtl="0" eaLnBrk="1" latinLnBrk="0" hangingPunct="1">
+              <a:lnSpc>
+                <a:spcPct val="90000"/>
+              </a:lnSpc>
+              <a:spcBef>
+                <a:spcPts val="500"/>
+              </a:spcBef>
+              <a:buFont typeface="Arial" panose="020B0604020202020204" pitchFamily="34" charset="0"/>
+              <a:buChar char="•"/>
+              <a:defRPr kumimoji="1" sz="1800" kern="1200">
+                <a:solidFill>
+                  <a:schemeClr val="tx1"/>
+                </a:solidFill>
+                <a:latin typeface="+mn-lt"/>
+                <a:ea typeface="+mn-ea"/>
+                <a:cs typeface="+mn-cs"/>
+              </a:defRPr>
+            </a:lvl8pPr>
+            <a:lvl9pPr marL="3886200" indent="-228600" algn="l" defTabSz="914400" rtl="0" eaLnBrk="1" latinLnBrk="0" hangingPunct="1">
+              <a:lnSpc>
+                <a:spcPct val="90000"/>
+              </a:lnSpc>
+              <a:spcBef>
+                <a:spcPts val="500"/>
+              </a:spcBef>
+              <a:buFont typeface="Arial" panose="020B0604020202020204" pitchFamily="34" charset="0"/>
+              <a:buChar char="•"/>
+              <a:defRPr kumimoji="1" sz="1800" kern="1200">
+                <a:solidFill>
+                  <a:schemeClr val="tx1"/>
+                </a:solidFill>
+                <a:latin typeface="+mn-lt"/>
+                <a:ea typeface="+mn-ea"/>
+                <a:cs typeface="+mn-cs"/>
+              </a:defRPr>
+            </a:lvl9pPr>
+          </a:lstStyle>
+          <a:p>
+            <a:pPr algn="ctr">
+              <a:buFontTx/>
+              <a:buChar char="-"/>
+            </a:pPr>
+            <a:r>
+              <a:rPr lang="ja-JP" altLang="en-US" sz="1200" dirty="0"/>
+              <a:t>なにがしかの機能実行</a:t>
+            </a:r>
+            <a:endParaRPr lang="en-US" altLang="ja-JP" sz="1200" dirty="0"/>
+          </a:p>
+          <a:p>
+            <a:pPr algn="ctr">
+              <a:buFontTx/>
+              <a:buChar char="-"/>
+            </a:pPr>
+            <a:endParaRPr lang="en-US" altLang="ja-JP" sz="1200" dirty="0"/>
+          </a:p>
+        </p:txBody>
+      </p:sp>
     </p:spTree>
     <p:extLst>
       <p:ext uri="{BB962C8B-B14F-4D97-AF65-F5344CB8AC3E}">
@@ -22342,12 +22581,15 @@
         </p:nvCxnSpPr>
         <p:spPr>
           <a:xfrm flipH="1">
-            <a:off x="1802295" y="4024638"/>
-            <a:ext cx="2971716" cy="907846"/>
+            <a:off x="3031435" y="4254853"/>
+            <a:ext cx="500420" cy="282302"/>
           </a:xfrm>
           <a:prstGeom prst="line">
             <a:avLst/>
           </a:prstGeom>
+          <a:ln>
+            <a:prstDash val="dash"/>
+          </a:ln>
         </p:spPr>
         <p:style>
           <a:lnRef idx="2">
@@ -23372,6 +23614,88 @@
           </a:p>
         </p:txBody>
       </p:sp>
+      <p:cxnSp>
+        <p:nvCxnSpPr>
+          <p:cNvPr id="22" name="直線コネクタ 21">
+            <a:extLst>
+              <a:ext uri="{FF2B5EF4-FFF2-40B4-BE49-F238E27FC236}">
+                <a16:creationId xmlns:a16="http://schemas.microsoft.com/office/drawing/2014/main" id="{47782C65-7EC7-F6D2-7D77-81FCA6256230}"/>
+              </a:ext>
+            </a:extLst>
+          </p:cNvPr>
+          <p:cNvCxnSpPr>
+            <a:cxnSpLocks/>
+          </p:cNvCxnSpPr>
+          <p:nvPr/>
+        </p:nvCxnSpPr>
+        <p:spPr>
+          <a:xfrm flipH="1">
+            <a:off x="3905253" y="4418548"/>
+            <a:ext cx="169749" cy="555384"/>
+          </a:xfrm>
+          <a:prstGeom prst="line">
+            <a:avLst/>
+          </a:prstGeom>
+          <a:ln>
+            <a:prstDash val="dash"/>
+          </a:ln>
+        </p:spPr>
+        <p:style>
+          <a:lnRef idx="2">
+            <a:schemeClr val="accent6"/>
+          </a:lnRef>
+          <a:fillRef idx="0">
+            <a:schemeClr val="accent6"/>
+          </a:fillRef>
+          <a:effectRef idx="1">
+            <a:schemeClr val="accent6"/>
+          </a:effectRef>
+          <a:fontRef idx="minor">
+            <a:schemeClr val="tx1"/>
+          </a:fontRef>
+        </p:style>
+      </p:cxnSp>
+      <p:cxnSp>
+        <p:nvCxnSpPr>
+          <p:cNvPr id="26" name="直線コネクタ 25">
+            <a:extLst>
+              <a:ext uri="{FF2B5EF4-FFF2-40B4-BE49-F238E27FC236}">
+                <a16:creationId xmlns:a16="http://schemas.microsoft.com/office/drawing/2014/main" id="{35430383-3C78-61B1-D569-530E7D66AA27}"/>
+              </a:ext>
+            </a:extLst>
+          </p:cNvPr>
+          <p:cNvCxnSpPr>
+            <a:cxnSpLocks/>
+          </p:cNvCxnSpPr>
+          <p:nvPr/>
+        </p:nvCxnSpPr>
+        <p:spPr>
+          <a:xfrm>
+            <a:off x="4740507" y="4456619"/>
+            <a:ext cx="597985" cy="314492"/>
+          </a:xfrm>
+          <a:prstGeom prst="line">
+            <a:avLst/>
+          </a:prstGeom>
+          <a:ln>
+            <a:prstDash val="dash"/>
+          </a:ln>
+        </p:spPr>
+        <p:style>
+          <a:lnRef idx="2">
+            <a:schemeClr val="accent6"/>
+          </a:lnRef>
+          <a:fillRef idx="0">
+            <a:schemeClr val="accent6"/>
+          </a:fillRef>
+          <a:effectRef idx="1">
+            <a:schemeClr val="accent6"/>
+          </a:effectRef>
+          <a:fontRef idx="minor">
+            <a:schemeClr val="tx1"/>
+          </a:fontRef>
+        </p:style>
+      </p:cxnSp>
     </p:spTree>
     <p:extLst>
       <p:ext uri="{BB962C8B-B14F-4D97-AF65-F5344CB8AC3E}">

</xml_diff>